<commit_message>
fig changed to have Inter-GPU Interconnect instead of NVLink
</commit_message>
<xml_diff>
--- a/figures/cache_configurations_static_dynamic.pptx
+++ b/figures/cache_configurations_static_dynamic.pptx
@@ -106,7 +106,7 @@
   </p:defaultTextStyle>
   <p:extLst>
     <p:ext uri="{EFAFB233-063F-42B5-8137-9DF3F51BA10A}">
-      <p15:sldGuideLst xmlns:p15="http://schemas.microsoft.com/office/powerpoint/2012/main">
+      <p15:sldGuideLst xmlns:p15="http://schemas.microsoft.com/office/powerpoint/2012/main" xmlns="">
         <p15:guide id="1" orient="horz" pos="1152">
           <p15:clr>
             <a:srgbClr val="A4A3A4"/>
@@ -302,7 +302,7 @@
           <a:p>
             <a:fld id="{A79B3858-976E-4C3E-BA77-60674B373806}" type="datetimeFigureOut">
               <a:rPr lang="en-US" smtClean="0"/>
-              <a:t>4/4/2017</a:t>
+              <a:t>7/12/2017</a:t>
             </a:fld>
             <a:endParaRPr lang="en-US"/>
           </a:p>
@@ -470,7 +470,7 @@
           <a:p>
             <a:fld id="{A79B3858-976E-4C3E-BA77-60674B373806}" type="datetimeFigureOut">
               <a:rPr lang="en-US" smtClean="0"/>
-              <a:t>4/4/2017</a:t>
+              <a:t>7/12/2017</a:t>
             </a:fld>
             <a:endParaRPr lang="en-US"/>
           </a:p>
@@ -648,7 +648,7 @@
           <a:p>
             <a:fld id="{A79B3858-976E-4C3E-BA77-60674B373806}" type="datetimeFigureOut">
               <a:rPr lang="en-US" smtClean="0"/>
-              <a:t>4/4/2017</a:t>
+              <a:t>7/12/2017</a:t>
             </a:fld>
             <a:endParaRPr lang="en-US"/>
           </a:p>
@@ -816,7 +816,7 @@
           <a:p>
             <a:fld id="{A79B3858-976E-4C3E-BA77-60674B373806}" type="datetimeFigureOut">
               <a:rPr lang="en-US" smtClean="0"/>
-              <a:t>4/4/2017</a:t>
+              <a:t>7/12/2017</a:t>
             </a:fld>
             <a:endParaRPr lang="en-US"/>
           </a:p>
@@ -1061,7 +1061,7 @@
           <a:p>
             <a:fld id="{A79B3858-976E-4C3E-BA77-60674B373806}" type="datetimeFigureOut">
               <a:rPr lang="en-US" smtClean="0"/>
-              <a:t>4/4/2017</a:t>
+              <a:t>7/12/2017</a:t>
             </a:fld>
             <a:endParaRPr lang="en-US"/>
           </a:p>
@@ -1346,7 +1346,7 @@
           <a:p>
             <a:fld id="{A79B3858-976E-4C3E-BA77-60674B373806}" type="datetimeFigureOut">
               <a:rPr lang="en-US" smtClean="0"/>
-              <a:t>4/4/2017</a:t>
+              <a:t>7/12/2017</a:t>
             </a:fld>
             <a:endParaRPr lang="en-US"/>
           </a:p>
@@ -1770,7 +1770,7 @@
           <a:p>
             <a:fld id="{A79B3858-976E-4C3E-BA77-60674B373806}" type="datetimeFigureOut">
               <a:rPr lang="en-US" smtClean="0"/>
-              <a:t>4/4/2017</a:t>
+              <a:t>7/12/2017</a:t>
             </a:fld>
             <a:endParaRPr lang="en-US"/>
           </a:p>
@@ -1887,7 +1887,7 @@
           <a:p>
             <a:fld id="{A79B3858-976E-4C3E-BA77-60674B373806}" type="datetimeFigureOut">
               <a:rPr lang="en-US" smtClean="0"/>
-              <a:t>4/4/2017</a:t>
+              <a:t>7/12/2017</a:t>
             </a:fld>
             <a:endParaRPr lang="en-US"/>
           </a:p>
@@ -1982,7 +1982,7 @@
           <a:p>
             <a:fld id="{A79B3858-976E-4C3E-BA77-60674B373806}" type="datetimeFigureOut">
               <a:rPr lang="en-US" smtClean="0"/>
-              <a:t>4/4/2017</a:t>
+              <a:t>7/12/2017</a:t>
             </a:fld>
             <a:endParaRPr lang="en-US"/>
           </a:p>
@@ -2257,7 +2257,7 @@
           <a:p>
             <a:fld id="{A79B3858-976E-4C3E-BA77-60674B373806}" type="datetimeFigureOut">
               <a:rPr lang="en-US" smtClean="0"/>
-              <a:t>4/4/2017</a:t>
+              <a:t>7/12/2017</a:t>
             </a:fld>
             <a:endParaRPr lang="en-US"/>
           </a:p>
@@ -2509,7 +2509,7 @@
           <a:p>
             <a:fld id="{A79B3858-976E-4C3E-BA77-60674B373806}" type="datetimeFigureOut">
               <a:rPr lang="en-US" smtClean="0"/>
-              <a:t>4/4/2017</a:t>
+              <a:t>7/12/2017</a:t>
             </a:fld>
             <a:endParaRPr lang="en-US"/>
           </a:p>
@@ -2720,7 +2720,7 @@
           <a:p>
             <a:fld id="{A79B3858-976E-4C3E-BA77-60674B373806}" type="datetimeFigureOut">
               <a:rPr lang="en-US" smtClean="0"/>
-              <a:t>4/4/2017</a:t>
+              <a:t>7/12/2017</a:t>
             </a:fld>
             <a:endParaRPr lang="en-US"/>
           </a:p>
@@ -3688,9 +3688,9 @@
         <p:grpSpPr>
           <a:xfrm>
             <a:off x="2701233" y="64028"/>
-            <a:ext cx="1986337" cy="3046707"/>
+            <a:ext cx="2001828" cy="3046707"/>
             <a:chOff x="2658148" y="64028"/>
-            <a:chExt cx="1986337" cy="3046707"/>
+            <a:chExt cx="2001828" cy="3046707"/>
           </a:xfrm>
         </p:grpSpPr>
         <p:sp>
@@ -3739,9 +3739,9 @@
           <p:grpSpPr>
             <a:xfrm>
               <a:off x="2658148" y="64028"/>
-              <a:ext cx="1886280" cy="3046707"/>
+              <a:ext cx="2001828" cy="3046707"/>
               <a:chOff x="2658148" y="64028"/>
-              <a:chExt cx="1886280" cy="3046707"/>
+              <a:chExt cx="2001828" cy="3046707"/>
             </a:xfrm>
           </p:grpSpPr>
           <p:sp>
@@ -3753,7 +3753,7 @@
             <p:spPr>
               <a:xfrm>
                 <a:off x="3870080" y="1511291"/>
-                <a:ext cx="638316" cy="276999"/>
+                <a:ext cx="789896" cy="276999"/>
               </a:xfrm>
               <a:prstGeom prst="rect">
                 <a:avLst/>
@@ -3767,8 +3767,8 @@
               <a:lstStyle/>
               <a:p>
                 <a:r>
-                  <a:rPr lang="en-US" sz="1200" b="1" dirty="0" err="1"/>
-                  <a:t>NVLink</a:t>
+                  <a:rPr lang="en-US" sz="1200" b="1" dirty="0" smtClean="0"/>
+                  <a:t>To Switch</a:t>
                 </a:r>
                 <a:endParaRPr lang="en-US" sz="1200" b="1" dirty="0"/>
               </a:p>
@@ -5289,9 +5289,9 @@
         <p:grpSpPr>
           <a:xfrm>
             <a:off x="311724" y="64028"/>
-            <a:ext cx="1986337" cy="3046707"/>
+            <a:ext cx="2001828" cy="3046707"/>
             <a:chOff x="2658148" y="64028"/>
-            <a:chExt cx="1986337" cy="3046707"/>
+            <a:chExt cx="2001828" cy="3046707"/>
           </a:xfrm>
         </p:grpSpPr>
         <p:sp>
@@ -5340,9 +5340,9 @@
           <p:grpSpPr>
             <a:xfrm>
               <a:off x="2658148" y="64028"/>
-              <a:ext cx="1886280" cy="3046707"/>
+              <a:ext cx="2001828" cy="3046707"/>
               <a:chOff x="2658148" y="64028"/>
-              <a:chExt cx="1886280" cy="3046707"/>
+              <a:chExt cx="2001828" cy="3046707"/>
             </a:xfrm>
           </p:grpSpPr>
           <p:sp>
@@ -5354,7 +5354,7 @@
             <p:spPr>
               <a:xfrm>
                 <a:off x="3870080" y="1511291"/>
-                <a:ext cx="638316" cy="276999"/>
+                <a:ext cx="789896" cy="276999"/>
               </a:xfrm>
               <a:prstGeom prst="rect">
                 <a:avLst/>
@@ -5368,8 +5368,8 @@
               <a:lstStyle/>
               <a:p>
                 <a:r>
-                  <a:rPr lang="en-US" sz="1200" b="1" dirty="0" err="1"/>
-                  <a:t>NVLink</a:t>
+                  <a:rPr lang="en-US" sz="1200" b="1" dirty="0" smtClean="0"/>
+                  <a:t>To Switch</a:t>
                 </a:r>
                 <a:endParaRPr lang="en-US" sz="1200" b="1" dirty="0"/>
               </a:p>
@@ -6516,9 +6516,9 @@
         <p:grpSpPr>
           <a:xfrm>
             <a:off x="5090742" y="64028"/>
-            <a:ext cx="1986337" cy="3046707"/>
+            <a:ext cx="2001828" cy="3046707"/>
             <a:chOff x="2658148" y="64028"/>
-            <a:chExt cx="1986337" cy="3046707"/>
+            <a:chExt cx="2001828" cy="3046707"/>
           </a:xfrm>
         </p:grpSpPr>
         <p:sp>
@@ -6567,9 +6567,9 @@
           <p:grpSpPr>
             <a:xfrm>
               <a:off x="2658148" y="64028"/>
-              <a:ext cx="1850248" cy="3046707"/>
+              <a:ext cx="2001828" cy="3046707"/>
               <a:chOff x="2658148" y="64028"/>
-              <a:chExt cx="1850248" cy="3046707"/>
+              <a:chExt cx="2001828" cy="3046707"/>
             </a:xfrm>
           </p:grpSpPr>
           <p:sp>
@@ -6581,7 +6581,7 @@
             <p:spPr>
               <a:xfrm>
                 <a:off x="3870080" y="1511291"/>
-                <a:ext cx="638316" cy="276999"/>
+                <a:ext cx="789896" cy="276999"/>
               </a:xfrm>
               <a:prstGeom prst="rect">
                 <a:avLst/>
@@ -6595,8 +6595,8 @@
               <a:lstStyle/>
               <a:p>
                 <a:r>
-                  <a:rPr lang="en-US" sz="1200" b="1" dirty="0" err="1"/>
-                  <a:t>NVLink</a:t>
+                  <a:rPr lang="en-US" sz="1200" b="1" dirty="0" smtClean="0"/>
+                  <a:t>To Switch</a:t>
                 </a:r>
                 <a:endParaRPr lang="en-US" sz="1200" b="1" dirty="0"/>
               </a:p>
@@ -7711,9 +7711,9 @@
         <p:grpSpPr>
           <a:xfrm>
             <a:off x="7480252" y="64028"/>
-            <a:ext cx="1986337" cy="3046707"/>
+            <a:ext cx="2001828" cy="3046707"/>
             <a:chOff x="2658148" y="64028"/>
-            <a:chExt cx="1986337" cy="3046707"/>
+            <a:chExt cx="2001828" cy="3046707"/>
           </a:xfrm>
         </p:grpSpPr>
         <p:sp>
@@ -7762,9 +7762,9 @@
           <p:grpSpPr>
             <a:xfrm>
               <a:off x="2658148" y="64028"/>
-              <a:ext cx="1850248" cy="3046707"/>
+              <a:ext cx="2001828" cy="3046707"/>
               <a:chOff x="2658148" y="64028"/>
-              <a:chExt cx="1850248" cy="3046707"/>
+              <a:chExt cx="2001828" cy="3046707"/>
             </a:xfrm>
           </p:grpSpPr>
           <p:sp>
@@ -7776,7 +7776,7 @@
             <p:spPr>
               <a:xfrm>
                 <a:off x="3870080" y="1511291"/>
-                <a:ext cx="638316" cy="276999"/>
+                <a:ext cx="789896" cy="276999"/>
               </a:xfrm>
               <a:prstGeom prst="rect">
                 <a:avLst/>
@@ -7790,8 +7790,8 @@
               <a:lstStyle/>
               <a:p>
                 <a:r>
-                  <a:rPr lang="en-US" sz="1200" b="1" dirty="0" err="1"/>
-                  <a:t>NVLink</a:t>
+                  <a:rPr lang="en-US" sz="1200" b="1" dirty="0" smtClean="0"/>
+                  <a:t>To Switch</a:t>
                 </a:r>
                 <a:endParaRPr lang="en-US" sz="1200" b="1" dirty="0"/>
               </a:p>

</xml_diff>